<commit_message>
mega quiz updated presentation
</commit_message>
<xml_diff>
--- a/MegaQuiz/MegaQuizFinal.pptx
+++ b/MegaQuiz/MegaQuizFinal.pptx
@@ -46,8 +46,10 @@
     <p:sldId id="298" r:id="rId40"/>
     <p:sldId id="299" r:id="rId41"/>
     <p:sldId id="300" r:id="rId42"/>
-    <p:sldId id="261" r:id="rId43"/>
-    <p:sldId id="262" r:id="rId44"/>
+    <p:sldId id="301" r:id="rId43"/>
+    <p:sldId id="302" r:id="rId44"/>
+    <p:sldId id="303" r:id="rId45"/>
+    <p:sldId id="304" r:id="rId46"/>
   </p:sldIdLst>
   <p:sldSz cx="12192000" cy="6858000"/>
   <p:notesSz cx="6858000" cy="9144000"/>
@@ -146,6 +148,11 @@
       </a:defRPr>
     </a:lvl9pPr>
   </p:defaultTextStyle>
+  <p:extLst>
+    <p:ext uri="{EFAFB233-063F-42B5-8137-9DF3F51BA10A}">
+      <p15:sldGuideLst xmlns:p15="http://schemas.microsoft.com/office/powerpoint/2012/main"/>
+    </p:ext>
+  </p:extLst>
 </p:presentation>
 </file>
 
@@ -4242,24 +4249,24 @@
         <p:spPr>
           <a:xfrm>
             <a:off x="438912" y="2374742"/>
-            <a:ext cx="11301984" cy="1754326"/>
-          </a:xfrm>
-          <a:prstGeom prst="rect">
-            <a:avLst/>
-          </a:prstGeom>
-          <a:noFill/>
-        </p:spPr>
-        <p:txBody>
-          <a:bodyPr wrap="square" rtlCol="0">
-            <a:spAutoFit/>
-          </a:bodyPr>
-          <a:lstStyle/>
-          <a:p>
-            <a:r>
-              <a:rPr lang="en-US" sz="5400" dirty="0" smtClean="0"/>
-              <a:t>Who invited Rabindranath Tagore to Italy in 1926?</a:t>
-            </a:r>
-            <a:endParaRPr lang="en-US" sz="5400" dirty="0"/>
+            <a:ext cx="11301984" cy="2308324"/>
+          </a:xfrm>
+          <a:prstGeom prst="rect">
+            <a:avLst/>
+          </a:prstGeom>
+          <a:noFill/>
+        </p:spPr>
+        <p:txBody>
+          <a:bodyPr wrap="square" rtlCol="0">
+            <a:spAutoFit/>
+          </a:bodyPr>
+          <a:lstStyle/>
+          <a:p>
+            <a:r>
+              <a:rPr lang="en-US" sz="7200" dirty="0" smtClean="0"/>
+              <a:t>What was the last country Rabindranath Tagore visited?</a:t>
+            </a:r>
+            <a:endParaRPr lang="en-US" sz="7200" dirty="0"/>
           </a:p>
         </p:txBody>
       </p:sp>
@@ -4358,7 +4365,14 @@
             <a:pPr algn="ctr"/>
             <a:r>
               <a:rPr lang="en-US" sz="9600" dirty="0" smtClean="0"/>
-              <a:t>Benito Mussolini</a:t>
+              <a:t>Ceylon/</a:t>
+            </a:r>
+          </a:p>
+          <a:p>
+            <a:pPr algn="ctr"/>
+            <a:r>
+              <a:rPr lang="en-US" sz="9600" dirty="0" smtClean="0"/>
+              <a:t>Sri-Lanka</a:t>
             </a:r>
             <a:endParaRPr lang="en-US" sz="9600" dirty="0"/>
           </a:p>
@@ -7008,7 +7022,7 @@
         <p:spPr>
           <a:xfrm>
             <a:off x="438912" y="2086154"/>
-            <a:ext cx="11301984" cy="1200329"/>
+            <a:ext cx="11301984" cy="2308324"/>
           </a:xfrm>
           <a:prstGeom prst="rect">
             <a:avLst/>
@@ -7023,7 +7037,7 @@
           <a:p>
             <a:r>
               <a:rPr lang="en-US" sz="7200" dirty="0" smtClean="0"/>
-              <a:t>Why did?</a:t>
+              <a:t>Who is known as “The Iron Lady”?</a:t>
             </a:r>
             <a:endParaRPr lang="en-US" sz="7200" dirty="0"/>
           </a:p>
@@ -7107,8 +7121,8 @@
         </p:nvSpPr>
         <p:spPr>
           <a:xfrm>
-            <a:off x="2530602" y="2350008"/>
-            <a:ext cx="7118604" cy="1569660"/>
+            <a:off x="176698" y="2350008"/>
+            <a:ext cx="11826412" cy="1569660"/>
           </a:xfrm>
           <a:prstGeom prst="rect">
             <a:avLst/>
@@ -7124,7 +7138,7 @@
             <a:pPr algn="ctr"/>
             <a:r>
               <a:rPr lang="en-US" sz="9600" dirty="0" smtClean="0"/>
-              <a:t>Sweden</a:t>
+              <a:t>Margaret Thatcher</a:t>
             </a:r>
             <a:endParaRPr lang="en-US" sz="9600" dirty="0"/>
           </a:p>
@@ -8372,118 +8386,14 @@
       </p:sp>
       <p:sp>
         <p:nvSpPr>
-          <p:cNvPr id="6" name="TextBox 5"/>
-          <p:cNvSpPr txBox="1"/>
-          <p:nvPr/>
-        </p:nvSpPr>
-        <p:spPr>
-          <a:xfrm>
-            <a:off x="457200" y="3977640"/>
-            <a:ext cx="4956048" cy="830997"/>
-          </a:xfrm>
-          <a:prstGeom prst="rect">
-            <a:avLst/>
-          </a:prstGeom>
-          <a:noFill/>
-        </p:spPr>
-        <p:txBody>
-          <a:bodyPr wrap="square" rtlCol="0">
-            <a:spAutoFit/>
-          </a:bodyPr>
-          <a:lstStyle/>
-          <a:p>
-            <a:endParaRPr lang="en-US" sz="4800" dirty="0"/>
-          </a:p>
-        </p:txBody>
-      </p:sp>
-      <p:sp>
-        <p:nvSpPr>
-          <p:cNvPr id="7" name="TextBox 6"/>
-          <p:cNvSpPr txBox="1"/>
-          <p:nvPr/>
-        </p:nvSpPr>
-        <p:spPr>
-          <a:xfrm>
-            <a:off x="6446520" y="3977640"/>
-            <a:ext cx="4956048" cy="830997"/>
-          </a:xfrm>
-          <a:prstGeom prst="rect">
-            <a:avLst/>
-          </a:prstGeom>
-          <a:noFill/>
-        </p:spPr>
-        <p:txBody>
-          <a:bodyPr wrap="square" rtlCol="0">
-            <a:spAutoFit/>
-          </a:bodyPr>
-          <a:lstStyle/>
-          <a:p>
-            <a:endParaRPr lang="en-US" sz="4800" dirty="0"/>
-          </a:p>
-        </p:txBody>
-      </p:sp>
-      <p:sp>
-        <p:nvSpPr>
-          <p:cNvPr id="8" name="TextBox 7"/>
-          <p:cNvSpPr txBox="1"/>
-          <p:nvPr/>
-        </p:nvSpPr>
-        <p:spPr>
-          <a:xfrm>
-            <a:off x="6446520" y="5111496"/>
-            <a:ext cx="4956048" cy="830997"/>
-          </a:xfrm>
-          <a:prstGeom prst="rect">
-            <a:avLst/>
-          </a:prstGeom>
-          <a:noFill/>
-        </p:spPr>
-        <p:txBody>
-          <a:bodyPr wrap="square" rtlCol="0">
-            <a:spAutoFit/>
-          </a:bodyPr>
-          <a:lstStyle/>
-          <a:p>
-            <a:endParaRPr lang="en-US" sz="4800" dirty="0"/>
-          </a:p>
-        </p:txBody>
-      </p:sp>
-      <p:sp>
-        <p:nvSpPr>
-          <p:cNvPr id="9" name="TextBox 8"/>
-          <p:cNvSpPr txBox="1"/>
-          <p:nvPr/>
-        </p:nvSpPr>
-        <p:spPr>
-          <a:xfrm>
-            <a:off x="640080" y="5111495"/>
-            <a:ext cx="4956048" cy="830997"/>
-          </a:xfrm>
-          <a:prstGeom prst="rect">
-            <a:avLst/>
-          </a:prstGeom>
-          <a:noFill/>
-        </p:spPr>
-        <p:txBody>
-          <a:bodyPr wrap="square" rtlCol="0">
-            <a:spAutoFit/>
-          </a:bodyPr>
-          <a:lstStyle/>
-          <a:p>
-            <a:endParaRPr lang="en-US" sz="4800" dirty="0"/>
-          </a:p>
-        </p:txBody>
-      </p:sp>
-      <p:sp>
-        <p:nvSpPr>
           <p:cNvPr id="10" name="TextBox 9"/>
           <p:cNvSpPr txBox="1"/>
           <p:nvPr/>
         </p:nvSpPr>
         <p:spPr>
           <a:xfrm>
-            <a:off x="438912" y="2086154"/>
-            <a:ext cx="11301984" cy="2308324"/>
+            <a:off x="617542" y="1865745"/>
+            <a:ext cx="10944724" cy="3416320"/>
           </a:xfrm>
           <a:prstGeom prst="rect">
             <a:avLst/>
@@ -8498,7 +8408,45 @@
           <a:p>
             <a:r>
               <a:rPr lang="en-US" sz="7200" dirty="0" smtClean="0"/>
-              <a:t>How many people have set their foot on the Moon?</a:t>
+              <a:t>In </a:t>
+            </a:r>
+            <a:r>
+              <a:rPr lang="en-US" sz="7200" dirty="0" err="1" smtClean="0"/>
+              <a:t>Spongebob</a:t>
+            </a:r>
+            <a:r>
+              <a:rPr lang="en-US" sz="7200" dirty="0" smtClean="0"/>
+              <a:t>,</a:t>
+            </a:r>
+          </a:p>
+          <a:p>
+            <a:r>
+              <a:rPr lang="en-US" sz="7200" dirty="0" smtClean="0"/>
+              <a:t>What was “</a:t>
+            </a:r>
+            <a:r>
+              <a:rPr lang="en-US" sz="7200" dirty="0" err="1" smtClean="0"/>
+              <a:t>Krusty</a:t>
+            </a:r>
+            <a:r>
+              <a:rPr lang="en-US" sz="7200" dirty="0" smtClean="0"/>
+              <a:t> </a:t>
+            </a:r>
+            <a:r>
+              <a:rPr lang="en-US" sz="7200" dirty="0" err="1" smtClean="0"/>
+              <a:t>Krabs</a:t>
+            </a:r>
+            <a:r>
+              <a:rPr lang="en-US" sz="7200" dirty="0" smtClean="0"/>
+              <a:t>” before Mr. </a:t>
+            </a:r>
+            <a:r>
+              <a:rPr lang="en-US" sz="7200" dirty="0" err="1" smtClean="0"/>
+              <a:t>Krabs</a:t>
+            </a:r>
+            <a:r>
+              <a:rPr lang="en-US" sz="7200" dirty="0" smtClean="0"/>
+              <a:t> acquired it?</a:t>
             </a:r>
             <a:endParaRPr lang="en-US" sz="7200" dirty="0"/>
           </a:p>
@@ -8569,8 +8517,13 @@
           <a:p>
             <a:r>
               <a:rPr lang="en-US" dirty="0" smtClean="0"/>
-              <a:t>Question #20</a:t>
-            </a:r>
+              <a:t>Question #</a:t>
+            </a:r>
+            <a:r>
+              <a:rPr lang="en-US" dirty="0" smtClean="0"/>
+              <a:t>20</a:t>
+            </a:r>
+            <a:endParaRPr lang="en-US" dirty="0" smtClean="0"/>
           </a:p>
         </p:txBody>
       </p:sp>
@@ -8583,7 +8536,7 @@
         <p:spPr>
           <a:xfrm>
             <a:off x="2530602" y="2350008"/>
-            <a:ext cx="7118604" cy="1569660"/>
+            <a:ext cx="7118604" cy="3046988"/>
           </a:xfrm>
           <a:prstGeom prst="rect">
             <a:avLst/>
@@ -8599,7 +8552,7 @@
             <a:pPr algn="ctr"/>
             <a:r>
               <a:rPr lang="en-US" sz="9600" dirty="0" smtClean="0"/>
-              <a:t>12</a:t>
+              <a:t>A retirement home</a:t>
             </a:r>
             <a:endParaRPr lang="en-US" sz="9600" dirty="0"/>
           </a:p>
@@ -8654,7 +8607,7 @@
         </p:nvSpPr>
         <p:spPr>
           <a:xfrm>
-            <a:off x="347472" y="393192"/>
+            <a:off x="457200" y="493776"/>
             <a:ext cx="11484864" cy="369332"/>
           </a:xfrm>
           <a:prstGeom prst="rect">
@@ -8670,8 +8623,17 @@
           <a:p>
             <a:r>
               <a:rPr lang="en-US" dirty="0" smtClean="0"/>
-              <a:t>Question #</a:t>
-            </a:r>
+              <a:t>Question </a:t>
+            </a:r>
+            <a:r>
+              <a:rPr lang="en-US" dirty="0" smtClean="0"/>
+              <a:t>#</a:t>
+            </a:r>
+            <a:r>
+              <a:rPr lang="en-US" dirty="0" smtClean="0"/>
+              <a:t>21</a:t>
+            </a:r>
+            <a:endParaRPr lang="en-US" dirty="0" smtClean="0"/>
           </a:p>
         </p:txBody>
       </p:sp>
@@ -8683,25 +8645,29 @@
         </p:nvSpPr>
         <p:spPr>
           <a:xfrm>
-            <a:off x="557784" y="4581144"/>
-            <a:ext cx="4956048" cy="369332"/>
-          </a:xfrm>
-          <a:prstGeom prst="rect">
-            <a:avLst/>
-          </a:prstGeom>
-          <a:noFill/>
-        </p:spPr>
-        <p:txBody>
-          <a:bodyPr wrap="square" rtlCol="0">
-            <a:spAutoFit/>
-          </a:bodyPr>
-          <a:lstStyle/>
-          <a:p>
-            <a:r>
-              <a:rPr lang="en-US" dirty="0" smtClean="0"/>
+            <a:off x="457200" y="3977640"/>
+            <a:ext cx="4956048" cy="707886"/>
+          </a:xfrm>
+          <a:prstGeom prst="rect">
+            <a:avLst/>
+          </a:prstGeom>
+          <a:noFill/>
+        </p:spPr>
+        <p:txBody>
+          <a:bodyPr wrap="square" rtlCol="0">
+            <a:spAutoFit/>
+          </a:bodyPr>
+          <a:lstStyle/>
+          <a:p>
+            <a:r>
+              <a:rPr lang="en-US" sz="4000" dirty="0" smtClean="0"/>
               <a:t>A) </a:t>
             </a:r>
-            <a:endParaRPr lang="en-US" dirty="0"/>
+            <a:r>
+              <a:rPr lang="en-US" sz="4000" dirty="0" err="1" smtClean="0"/>
+              <a:t>Goldfinger</a:t>
+            </a:r>
+            <a:endParaRPr lang="en-US" sz="4000" dirty="0"/>
           </a:p>
         </p:txBody>
       </p:sp>
@@ -8713,25 +8679,25 @@
         </p:nvSpPr>
         <p:spPr>
           <a:xfrm>
-            <a:off x="6547104" y="4581144"/>
-            <a:ext cx="4956048" cy="369332"/>
-          </a:xfrm>
-          <a:prstGeom prst="rect">
-            <a:avLst/>
-          </a:prstGeom>
-          <a:noFill/>
-        </p:spPr>
-        <p:txBody>
-          <a:bodyPr wrap="square" rtlCol="0">
-            <a:spAutoFit/>
-          </a:bodyPr>
-          <a:lstStyle/>
-          <a:p>
-            <a:r>
-              <a:rPr lang="en-US" dirty="0" smtClean="0"/>
-              <a:t>B)</a:t>
-            </a:r>
-            <a:endParaRPr lang="en-US" dirty="0"/>
+            <a:off x="6446520" y="3977640"/>
+            <a:ext cx="4956048" cy="1323439"/>
+          </a:xfrm>
+          <a:prstGeom prst="rect">
+            <a:avLst/>
+          </a:prstGeom>
+          <a:noFill/>
+        </p:spPr>
+        <p:txBody>
+          <a:bodyPr wrap="square" rtlCol="0">
+            <a:spAutoFit/>
+          </a:bodyPr>
+          <a:lstStyle/>
+          <a:p>
+            <a:r>
+              <a:rPr lang="en-US" sz="4000" dirty="0" smtClean="0"/>
+              <a:t>B) Never Say Never Again</a:t>
+            </a:r>
+            <a:endParaRPr lang="en-US" sz="4000" dirty="0"/>
           </a:p>
         </p:txBody>
       </p:sp>
@@ -8743,25 +8709,37 @@
         </p:nvSpPr>
         <p:spPr>
           <a:xfrm>
-            <a:off x="6547104" y="5715000"/>
-            <a:ext cx="4956048" cy="369332"/>
-          </a:xfrm>
-          <a:prstGeom prst="rect">
-            <a:avLst/>
-          </a:prstGeom>
-          <a:noFill/>
-        </p:spPr>
-        <p:txBody>
-          <a:bodyPr wrap="square" rtlCol="0">
-            <a:spAutoFit/>
-          </a:bodyPr>
-          <a:lstStyle/>
-          <a:p>
-            <a:r>
-              <a:rPr lang="en-US" dirty="0" smtClean="0"/>
-              <a:t>D)</a:t>
-            </a:r>
-            <a:endParaRPr lang="en-US" dirty="0"/>
+            <a:off x="6446520" y="5111496"/>
+            <a:ext cx="4956048" cy="707886"/>
+          </a:xfrm>
+          <a:prstGeom prst="rect">
+            <a:avLst/>
+          </a:prstGeom>
+          <a:noFill/>
+        </p:spPr>
+        <p:txBody>
+          <a:bodyPr wrap="square" rtlCol="0">
+            <a:spAutoFit/>
+          </a:bodyPr>
+          <a:lstStyle/>
+          <a:p>
+            <a:r>
+              <a:rPr lang="en-US" sz="4000" dirty="0" smtClean="0"/>
+              <a:t>D</a:t>
+            </a:r>
+            <a:r>
+              <a:rPr lang="en-US" sz="4000" dirty="0" smtClean="0"/>
+              <a:t>) </a:t>
+            </a:r>
+            <a:r>
+              <a:rPr lang="en-US" sz="4000" dirty="0" err="1" smtClean="0"/>
+              <a:t>Thunderball</a:t>
+            </a:r>
+            <a:r>
+              <a:rPr lang="en-US" sz="4000" dirty="0" smtClean="0"/>
+              <a:t> </a:t>
+            </a:r>
+            <a:endParaRPr lang="en-US" sz="4000" dirty="0"/>
           </a:p>
         </p:txBody>
       </p:sp>
@@ -8773,32 +8751,66 @@
         </p:nvSpPr>
         <p:spPr>
           <a:xfrm>
-            <a:off x="557784" y="5715000"/>
-            <a:ext cx="4956048" cy="369332"/>
-          </a:xfrm>
-          <a:prstGeom prst="rect">
-            <a:avLst/>
-          </a:prstGeom>
-          <a:noFill/>
-        </p:spPr>
-        <p:txBody>
-          <a:bodyPr wrap="square" rtlCol="0">
-            <a:spAutoFit/>
-          </a:bodyPr>
-          <a:lstStyle/>
-          <a:p>
-            <a:r>
-              <a:rPr lang="en-US" dirty="0" smtClean="0"/>
-              <a:t>C)</a:t>
-            </a:r>
-            <a:endParaRPr lang="en-US" dirty="0"/>
+            <a:off x="457200" y="5111496"/>
+            <a:ext cx="4956048" cy="1323439"/>
+          </a:xfrm>
+          <a:prstGeom prst="rect">
+            <a:avLst/>
+          </a:prstGeom>
+          <a:noFill/>
+        </p:spPr>
+        <p:txBody>
+          <a:bodyPr wrap="square" rtlCol="0">
+            <a:spAutoFit/>
+          </a:bodyPr>
+          <a:lstStyle/>
+          <a:p>
+            <a:r>
+              <a:rPr lang="en-US" sz="4000" dirty="0" smtClean="0"/>
+              <a:t>C) </a:t>
+            </a:r>
+            <a:r>
+              <a:rPr lang="en-US" sz="4000" dirty="0" smtClean="0"/>
+              <a:t>Diamonds are Forever</a:t>
+            </a:r>
+            <a:endParaRPr lang="en-US" sz="4000" dirty="0"/>
+          </a:p>
+        </p:txBody>
+      </p:sp>
+      <p:sp>
+        <p:nvSpPr>
+          <p:cNvPr id="10" name="TextBox 9"/>
+          <p:cNvSpPr txBox="1"/>
+          <p:nvPr/>
+        </p:nvSpPr>
+        <p:spPr>
+          <a:xfrm>
+            <a:off x="457200" y="1127712"/>
+            <a:ext cx="11183112" cy="1754326"/>
+          </a:xfrm>
+          <a:prstGeom prst="rect">
+            <a:avLst/>
+          </a:prstGeom>
+          <a:noFill/>
+        </p:spPr>
+        <p:txBody>
+          <a:bodyPr wrap="square" rtlCol="0">
+            <a:spAutoFit/>
+          </a:bodyPr>
+          <a:lstStyle/>
+          <a:p>
+            <a:r>
+              <a:rPr lang="en-US" sz="5400" dirty="0" smtClean="0"/>
+              <a:t>In which James Bond film does Rowan Atkinson appear?</a:t>
+            </a:r>
+            <a:endParaRPr lang="en-US" sz="5400" dirty="0"/>
           </a:p>
         </p:txBody>
       </p:sp>
     </p:spTree>
     <p:extLst>
       <p:ext uri="{BB962C8B-B14F-4D97-AF65-F5344CB8AC3E}">
-        <p14:creationId xmlns:p14="http://schemas.microsoft.com/office/powerpoint/2010/main" val="3666862241"/>
+        <p14:creationId xmlns:p14="http://schemas.microsoft.com/office/powerpoint/2010/main" val="802905424"/>
       </p:ext>
     </p:extLst>
   </p:cSld>
@@ -8860,8 +8872,13 @@
           <a:p>
             <a:r>
               <a:rPr lang="en-US" dirty="0" smtClean="0"/>
-              <a:t>Question #</a:t>
-            </a:r>
+              <a:t>Question </a:t>
+            </a:r>
+            <a:r>
+              <a:rPr lang="en-US" dirty="0" smtClean="0"/>
+              <a:t>#21</a:t>
+            </a:r>
+            <a:endParaRPr lang="en-US" dirty="0" smtClean="0"/>
           </a:p>
         </p:txBody>
       </p:sp>
@@ -8873,8 +8890,8 @@
         </p:nvSpPr>
         <p:spPr>
           <a:xfrm>
-            <a:off x="3621024" y="4544568"/>
-            <a:ext cx="5257800" cy="369332"/>
+            <a:off x="603504" y="2514600"/>
+            <a:ext cx="10972800" cy="1200329"/>
           </a:xfrm>
           <a:prstGeom prst="rect">
             <a:avLst/>
@@ -8889,8 +8906,38 @@
           <a:p>
             <a:pPr algn="ctr"/>
             <a:r>
+              <a:rPr lang="en-US" sz="7200" dirty="0" smtClean="0"/>
+              <a:t>B) Never Say Never Again</a:t>
+            </a:r>
+            <a:endParaRPr lang="en-US" sz="7200" dirty="0"/>
+          </a:p>
+        </p:txBody>
+      </p:sp>
+      <p:sp>
+        <p:nvSpPr>
+          <p:cNvPr id="3" name="TextBox 2"/>
+          <p:cNvSpPr txBox="1"/>
+          <p:nvPr/>
+        </p:nvSpPr>
+        <p:spPr>
+          <a:xfrm>
+            <a:off x="4406494" y="3928056"/>
+            <a:ext cx="3366819" cy="369332"/>
+          </a:xfrm>
+          <a:prstGeom prst="rect">
+            <a:avLst/>
+          </a:prstGeom>
+          <a:noFill/>
+        </p:spPr>
+        <p:txBody>
+          <a:bodyPr wrap="none" rtlCol="0">
+            <a:spAutoFit/>
+          </a:bodyPr>
+          <a:lstStyle/>
+          <a:p>
+            <a:r>
               <a:rPr lang="en-US" dirty="0" smtClean="0"/>
-              <a:t>) </a:t>
+              <a:t>His name was Nigel Small-Fawcett</a:t>
             </a:r>
             <a:endParaRPr lang="en-US" dirty="0"/>
           </a:p>
@@ -8899,7 +8946,230 @@
     </p:spTree>
     <p:extLst>
       <p:ext uri="{BB962C8B-B14F-4D97-AF65-F5344CB8AC3E}">
-        <p14:creationId xmlns:p14="http://schemas.microsoft.com/office/powerpoint/2010/main" val="7869226"/>
+        <p14:creationId xmlns:p14="http://schemas.microsoft.com/office/powerpoint/2010/main" val="343684654"/>
+      </p:ext>
+    </p:extLst>
+  </p:cSld>
+  <p:clrMapOvr>
+    <a:masterClrMapping/>
+  </p:clrMapOvr>
+</p:sld>
+</file>
+
+<file path=ppt/slides/slide44.xml><?xml version="1.0" encoding="utf-8"?>
+<p:sld xmlns:a="http://schemas.openxmlformats.org/drawingml/2006/main" xmlns:r="http://schemas.openxmlformats.org/officeDocument/2006/relationships" xmlns:p="http://schemas.openxmlformats.org/presentationml/2006/main">
+  <p:cSld>
+    <p:bg>
+      <p:bgPr>
+        <a:solidFill>
+          <a:schemeClr val="accent6">
+            <a:lumMod val="60000"/>
+            <a:lumOff val="40000"/>
+          </a:schemeClr>
+        </a:solidFill>
+        <a:effectLst/>
+      </p:bgPr>
+    </p:bg>
+    <p:spTree>
+      <p:nvGrpSpPr>
+        <p:cNvPr id="1" name=""/>
+        <p:cNvGrpSpPr/>
+        <p:nvPr/>
+      </p:nvGrpSpPr>
+      <p:grpSpPr>
+        <a:xfrm>
+          <a:off x="0" y="0"/>
+          <a:ext cx="0" cy="0"/>
+          <a:chOff x="0" y="0"/>
+          <a:chExt cx="0" cy="0"/>
+        </a:xfrm>
+      </p:grpSpPr>
+      <p:sp>
+        <p:nvSpPr>
+          <p:cNvPr id="4" name="TextBox 3"/>
+          <p:cNvSpPr txBox="1"/>
+          <p:nvPr/>
+        </p:nvSpPr>
+        <p:spPr>
+          <a:xfrm>
+            <a:off x="347472" y="393192"/>
+            <a:ext cx="11484864" cy="369332"/>
+          </a:xfrm>
+          <a:prstGeom prst="rect">
+            <a:avLst/>
+          </a:prstGeom>
+          <a:noFill/>
+        </p:spPr>
+        <p:txBody>
+          <a:bodyPr wrap="square" rtlCol="0">
+            <a:spAutoFit/>
+          </a:bodyPr>
+          <a:lstStyle/>
+          <a:p>
+            <a:r>
+              <a:rPr lang="en-US" dirty="0"/>
+              <a:t>Question </a:t>
+            </a:r>
+            <a:r>
+              <a:rPr lang="en-US" dirty="0" smtClean="0"/>
+              <a:t>#22</a:t>
+            </a:r>
+            <a:endParaRPr lang="en-US" dirty="0"/>
+          </a:p>
+        </p:txBody>
+      </p:sp>
+      <p:sp>
+        <p:nvSpPr>
+          <p:cNvPr id="2" name="TextBox 1"/>
+          <p:cNvSpPr txBox="1"/>
+          <p:nvPr/>
+        </p:nvSpPr>
+        <p:spPr>
+          <a:xfrm>
+            <a:off x="1298962" y="1365161"/>
+            <a:ext cx="9581884" cy="4154984"/>
+          </a:xfrm>
+          <a:prstGeom prst="rect">
+            <a:avLst/>
+          </a:prstGeom>
+          <a:noFill/>
+        </p:spPr>
+        <p:txBody>
+          <a:bodyPr wrap="square" rtlCol="0">
+            <a:spAutoFit/>
+          </a:bodyPr>
+          <a:lstStyle/>
+          <a:p>
+            <a:r>
+              <a:rPr lang="en-US" sz="8800" dirty="0" smtClean="0"/>
+              <a:t>How did </a:t>
+            </a:r>
+          </a:p>
+          <a:p>
+            <a:r>
+              <a:rPr lang="en-US" sz="8800" dirty="0" smtClean="0"/>
+              <a:t>Michael Jackson </a:t>
+            </a:r>
+          </a:p>
+          <a:p>
+            <a:r>
+              <a:rPr lang="en-US" sz="8800" dirty="0" smtClean="0"/>
+              <a:t>die?</a:t>
+            </a:r>
+            <a:endParaRPr lang="en-US" sz="8800" dirty="0"/>
+          </a:p>
+        </p:txBody>
+      </p:sp>
+    </p:spTree>
+    <p:extLst>
+      <p:ext uri="{BB962C8B-B14F-4D97-AF65-F5344CB8AC3E}">
+        <p14:creationId xmlns:p14="http://schemas.microsoft.com/office/powerpoint/2010/main" val="3295924121"/>
+      </p:ext>
+    </p:extLst>
+  </p:cSld>
+  <p:clrMapOvr>
+    <a:masterClrMapping/>
+  </p:clrMapOvr>
+</p:sld>
+</file>
+
+<file path=ppt/slides/slide45.xml><?xml version="1.0" encoding="utf-8"?>
+<p:sld xmlns:a="http://schemas.openxmlformats.org/drawingml/2006/main" xmlns:r="http://schemas.openxmlformats.org/officeDocument/2006/relationships" xmlns:p="http://schemas.openxmlformats.org/presentationml/2006/main">
+  <p:cSld>
+    <p:bg>
+      <p:bgPr>
+        <a:solidFill>
+          <a:schemeClr val="accent6">
+            <a:lumMod val="60000"/>
+            <a:lumOff val="40000"/>
+          </a:schemeClr>
+        </a:solidFill>
+        <a:effectLst/>
+      </p:bgPr>
+    </p:bg>
+    <p:spTree>
+      <p:nvGrpSpPr>
+        <p:cNvPr id="1" name=""/>
+        <p:cNvGrpSpPr/>
+        <p:nvPr/>
+      </p:nvGrpSpPr>
+      <p:grpSpPr>
+        <a:xfrm>
+          <a:off x="0" y="0"/>
+          <a:ext cx="0" cy="0"/>
+          <a:chOff x="0" y="0"/>
+          <a:chExt cx="0" cy="0"/>
+        </a:xfrm>
+      </p:grpSpPr>
+      <p:sp>
+        <p:nvSpPr>
+          <p:cNvPr id="4" name="TextBox 3"/>
+          <p:cNvSpPr txBox="1"/>
+          <p:nvPr/>
+        </p:nvSpPr>
+        <p:spPr>
+          <a:xfrm>
+            <a:off x="347472" y="393192"/>
+            <a:ext cx="11484864" cy="369332"/>
+          </a:xfrm>
+          <a:prstGeom prst="rect">
+            <a:avLst/>
+          </a:prstGeom>
+          <a:noFill/>
+        </p:spPr>
+        <p:txBody>
+          <a:bodyPr wrap="square" rtlCol="0">
+            <a:spAutoFit/>
+          </a:bodyPr>
+          <a:lstStyle/>
+          <a:p>
+            <a:r>
+              <a:rPr lang="en-US" dirty="0" smtClean="0"/>
+              <a:t>Question </a:t>
+            </a:r>
+            <a:r>
+              <a:rPr lang="en-US" dirty="0" smtClean="0"/>
+              <a:t>#22</a:t>
+            </a:r>
+            <a:endParaRPr lang="en-US" dirty="0" smtClean="0"/>
+          </a:p>
+        </p:txBody>
+      </p:sp>
+      <p:sp>
+        <p:nvSpPr>
+          <p:cNvPr id="2" name="TextBox 1"/>
+          <p:cNvSpPr txBox="1"/>
+          <p:nvPr/>
+        </p:nvSpPr>
+        <p:spPr>
+          <a:xfrm>
+            <a:off x="1275008" y="2350008"/>
+            <a:ext cx="9629792" cy="1569660"/>
+          </a:xfrm>
+          <a:prstGeom prst="rect">
+            <a:avLst/>
+          </a:prstGeom>
+          <a:noFill/>
+        </p:spPr>
+        <p:txBody>
+          <a:bodyPr wrap="square" rtlCol="0">
+            <a:spAutoFit/>
+          </a:bodyPr>
+          <a:lstStyle/>
+          <a:p>
+            <a:pPr algn="ctr"/>
+            <a:r>
+              <a:rPr lang="en-US" sz="9600" dirty="0" smtClean="0"/>
+              <a:t>Cardiac Arrest</a:t>
+            </a:r>
+            <a:endParaRPr lang="en-US" sz="9600" dirty="0"/>
+          </a:p>
+        </p:txBody>
+      </p:sp>
+    </p:spTree>
+    <p:extLst>
+      <p:ext uri="{BB962C8B-B14F-4D97-AF65-F5344CB8AC3E}">
+        <p14:creationId xmlns:p14="http://schemas.microsoft.com/office/powerpoint/2010/main" val="1067803822"/>
       </p:ext>
     </p:extLst>
   </p:cSld>

</xml_diff>